<commit_message>
update presentation based on 2021 data
</commit_message>
<xml_diff>
--- a/presentation/data_inventory_figures.pptx
+++ b/presentation/data_inventory_figures.pptx
@@ -124,333 +124,35 @@
 </p:presentation>
 </file>
 
-<file path=ppt/revisionInfo.xml><?xml version="1.0" encoding="utf-8"?>
-<p1510:revInfo xmlns:a="http://schemas.openxmlformats.org/drawingml/2006/main" xmlns:r="http://schemas.openxmlformats.org/officeDocument/2006/relationships" xmlns:p1510="http://schemas.microsoft.com/office/powerpoint/2015/10/main">
-  <p1510:revLst>
-    <p1510:client id="{EEA9412B-3176-4D37-9EAC-DF2FF773A7C5}" v="34" dt="2020-05-08T19:42:57.319"/>
-  </p1510:revLst>
-</p1510:revInfo>
-</file>
-
 <file path=ppt/changesInfos/changesInfo1.xml><?xml version="1.0" encoding="utf-8"?>
 <pc:chgInfo xmlns:a="http://schemas.openxmlformats.org/drawingml/2006/main" xmlns:r="http://schemas.openxmlformats.org/officeDocument/2006/relationships" xmlns:ac="http://schemas.microsoft.com/office/drawing/2013/main/command" xmlns:pc="http://schemas.microsoft.com/office/powerpoint/2013/main/command">
   <pc:docChgLst>
-    <pc:chgData name="Dominick Lemas" userId="5a87caf6b30614cd" providerId="LiveId" clId="{EEA9412B-3176-4D37-9EAC-DF2FF773A7C5}"/>
-    <pc:docChg chg="custSel addSld modSld sldOrd">
-      <pc:chgData name="Dominick Lemas" userId="5a87caf6b30614cd" providerId="LiveId" clId="{EEA9412B-3176-4D37-9EAC-DF2FF773A7C5}" dt="2020-05-08T19:43:35.761" v="2722" actId="20577"/>
+    <pc:chgData name="Ballard,Hailey K" userId="23de628d-c853-4d3b-a32c-f06cb7215a98" providerId="ADAL" clId="{931B25A2-48B8-4348-A640-0986360107E4}"/>
+    <pc:docChg chg="modSld">
+      <pc:chgData name="Ballard,Hailey K" userId="23de628d-c853-4d3b-a32c-f06cb7215a98" providerId="ADAL" clId="{931B25A2-48B8-4348-A640-0986360107E4}" dt="2021-09-29T17:47:22.466" v="125" actId="1076"/>
       <pc:docMkLst>
         <pc:docMk/>
       </pc:docMkLst>
-      <pc:sldChg chg="addSp delSp modSp mod ord">
-        <pc:chgData name="Dominick Lemas" userId="5a87caf6b30614cd" providerId="LiveId" clId="{EEA9412B-3176-4D37-9EAC-DF2FF773A7C5}" dt="2020-05-08T19:34:19.333" v="1842"/>
-        <pc:sldMkLst>
-          <pc:docMk/>
-          <pc:sldMk cId="1112947761" sldId="256"/>
-        </pc:sldMkLst>
-        <pc:spChg chg="add del">
-          <ac:chgData name="Dominick Lemas" userId="5a87caf6b30614cd" providerId="LiveId" clId="{EEA9412B-3176-4D37-9EAC-DF2FF773A7C5}" dt="2020-05-08T18:52:14.925" v="1" actId="478"/>
-          <ac:spMkLst>
-            <pc:docMk/>
-            <pc:sldMk cId="1112947761" sldId="256"/>
-            <ac:spMk id="4" creationId="{9B12373C-E30C-4F76-AC7D-0272BA2845B3}"/>
-          </ac:spMkLst>
-        </pc:spChg>
-        <pc:spChg chg="add mod">
-          <ac:chgData name="Dominick Lemas" userId="5a87caf6b30614cd" providerId="LiveId" clId="{EEA9412B-3176-4D37-9EAC-DF2FF773A7C5}" dt="2020-05-08T19:34:19.333" v="1842"/>
-          <ac:spMkLst>
-            <pc:docMk/>
-            <pc:sldMk cId="1112947761" sldId="256"/>
-            <ac:spMk id="7" creationId="{B87D8751-7941-4330-AE48-FC961BC26B53}"/>
-          </ac:spMkLst>
-        </pc:spChg>
-        <pc:graphicFrameChg chg="add mod modGraphic">
-          <ac:chgData name="Dominick Lemas" userId="5a87caf6b30614cd" providerId="LiveId" clId="{EEA9412B-3176-4D37-9EAC-DF2FF773A7C5}" dt="2020-05-08T18:59:56.880" v="420" actId="1076"/>
-          <ac:graphicFrameMkLst>
-            <pc:docMk/>
-            <pc:sldMk cId="1112947761" sldId="256"/>
-            <ac:graphicFrameMk id="5" creationId="{FEFE7B45-6B60-452A-97A9-EB84E48A19A6}"/>
-          </ac:graphicFrameMkLst>
-        </pc:graphicFrameChg>
-      </pc:sldChg>
-      <pc:sldChg chg="addSp delSp modSp new mod">
-        <pc:chgData name="Dominick Lemas" userId="5a87caf6b30614cd" providerId="LiveId" clId="{EEA9412B-3176-4D37-9EAC-DF2FF773A7C5}" dt="2020-05-08T19:05:27.150" v="743" actId="20577"/>
-        <pc:sldMkLst>
-          <pc:docMk/>
-          <pc:sldMk cId="299227955" sldId="257"/>
-        </pc:sldMkLst>
-        <pc:spChg chg="del">
-          <ac:chgData name="Dominick Lemas" userId="5a87caf6b30614cd" providerId="LiveId" clId="{EEA9412B-3176-4D37-9EAC-DF2FF773A7C5}" dt="2020-05-08T19:00:06.013" v="422" actId="478"/>
-          <ac:spMkLst>
-            <pc:docMk/>
-            <pc:sldMk cId="299227955" sldId="257"/>
-            <ac:spMk id="2" creationId="{615828B8-8602-40FD-9AD1-B2597ACF9EFE}"/>
-          </ac:spMkLst>
-        </pc:spChg>
-        <pc:spChg chg="del">
-          <ac:chgData name="Dominick Lemas" userId="5a87caf6b30614cd" providerId="LiveId" clId="{EEA9412B-3176-4D37-9EAC-DF2FF773A7C5}" dt="2020-05-08T19:00:07.420" v="423" actId="478"/>
-          <ac:spMkLst>
-            <pc:docMk/>
-            <pc:sldMk cId="299227955" sldId="257"/>
-            <ac:spMk id="3" creationId="{85D236B5-6227-43BA-83E4-79171F071B3E}"/>
-          </ac:spMkLst>
-        </pc:spChg>
-        <pc:spChg chg="add del mod">
-          <ac:chgData name="Dominick Lemas" userId="5a87caf6b30614cd" providerId="LiveId" clId="{EEA9412B-3176-4D37-9EAC-DF2FF773A7C5}" dt="2020-05-08T19:00:42.210" v="441"/>
-          <ac:spMkLst>
-            <pc:docMk/>
-            <pc:sldMk cId="299227955" sldId="257"/>
-            <ac:spMk id="4" creationId="{C8A18D8C-971C-4EE5-B9D4-90672E9ECC48}"/>
-          </ac:spMkLst>
-        </pc:spChg>
-        <pc:spChg chg="add mod">
-          <ac:chgData name="Dominick Lemas" userId="5a87caf6b30614cd" providerId="LiveId" clId="{EEA9412B-3176-4D37-9EAC-DF2FF773A7C5}" dt="2020-05-08T19:00:58.893" v="463" actId="20577"/>
-          <ac:spMkLst>
-            <pc:docMk/>
-            <pc:sldMk cId="299227955" sldId="257"/>
-            <ac:spMk id="7" creationId="{47CECAE5-6245-4ECF-AE3A-F83479A2791A}"/>
-          </ac:spMkLst>
-        </pc:spChg>
-        <pc:spChg chg="add mod">
-          <ac:chgData name="Dominick Lemas" userId="5a87caf6b30614cd" providerId="LiveId" clId="{EEA9412B-3176-4D37-9EAC-DF2FF773A7C5}" dt="2020-05-08T19:03:42.088" v="588" actId="14100"/>
-          <ac:spMkLst>
-            <pc:docMk/>
-            <pc:sldMk cId="299227955" sldId="257"/>
-            <ac:spMk id="8" creationId="{28C54EEC-624F-402E-B892-A35705A50A01}"/>
-          </ac:spMkLst>
-        </pc:spChg>
-        <pc:spChg chg="add mod">
-          <ac:chgData name="Dominick Lemas" userId="5a87caf6b30614cd" providerId="LiveId" clId="{EEA9412B-3176-4D37-9EAC-DF2FF773A7C5}" dt="2020-05-08T19:01:59.344" v="476" actId="207"/>
-          <ac:spMkLst>
-            <pc:docMk/>
-            <pc:sldMk cId="299227955" sldId="257"/>
-            <ac:spMk id="9" creationId="{245D1E3E-3AD3-4A1D-B30E-99D4D8618426}"/>
-          </ac:spMkLst>
-        </pc:spChg>
-        <pc:spChg chg="add mod">
-          <ac:chgData name="Dominick Lemas" userId="5a87caf6b30614cd" providerId="LiveId" clId="{EEA9412B-3176-4D37-9EAC-DF2FF773A7C5}" dt="2020-05-08T19:03:45.695" v="589" actId="14100"/>
-          <ac:spMkLst>
-            <pc:docMk/>
-            <pc:sldMk cId="299227955" sldId="257"/>
-            <ac:spMk id="10" creationId="{95F690BE-5336-444A-A84B-92F16E632C63}"/>
-          </ac:spMkLst>
-        </pc:spChg>
-        <pc:spChg chg="add mod">
-          <ac:chgData name="Dominick Lemas" userId="5a87caf6b30614cd" providerId="LiveId" clId="{EEA9412B-3176-4D37-9EAC-DF2FF773A7C5}" dt="2020-05-08T19:02:27.052" v="489" actId="20577"/>
-          <ac:spMkLst>
-            <pc:docMk/>
-            <pc:sldMk cId="299227955" sldId="257"/>
-            <ac:spMk id="13" creationId="{E65DB5F6-DC67-48E0-A5D3-70694FD22FB5}"/>
-          </ac:spMkLst>
-        </pc:spChg>
-        <pc:spChg chg="add mod">
-          <ac:chgData name="Dominick Lemas" userId="5a87caf6b30614cd" providerId="LiveId" clId="{EEA9412B-3176-4D37-9EAC-DF2FF773A7C5}" dt="2020-05-08T19:02:44.047" v="501" actId="14100"/>
-          <ac:spMkLst>
-            <pc:docMk/>
-            <pc:sldMk cId="299227955" sldId="257"/>
-            <ac:spMk id="14" creationId="{43FA60B6-66A6-405A-B484-87AF362B01FE}"/>
-          </ac:spMkLst>
-        </pc:spChg>
-        <pc:spChg chg="add mod">
-          <ac:chgData name="Dominick Lemas" userId="5a87caf6b30614cd" providerId="LiveId" clId="{EEA9412B-3176-4D37-9EAC-DF2FF773A7C5}" dt="2020-05-08T19:03:05.052" v="554" actId="1036"/>
-          <ac:spMkLst>
-            <pc:docMk/>
-            <pc:sldMk cId="299227955" sldId="257"/>
-            <ac:spMk id="15" creationId="{9653434B-FB06-4DA5-A2C2-9149FC953E49}"/>
-          </ac:spMkLst>
-        </pc:spChg>
-        <pc:spChg chg="add mod">
-          <ac:chgData name="Dominick Lemas" userId="5a87caf6b30614cd" providerId="LiveId" clId="{EEA9412B-3176-4D37-9EAC-DF2FF773A7C5}" dt="2020-05-08T19:05:27.150" v="743" actId="20577"/>
-          <ac:spMkLst>
-            <pc:docMk/>
-            <pc:sldMk cId="299227955" sldId="257"/>
-            <ac:spMk id="16" creationId="{9919912D-EED0-41DE-87F1-DF095752B209}"/>
-          </ac:spMkLst>
-        </pc:spChg>
-        <pc:spChg chg="add mod">
-          <ac:chgData name="Dominick Lemas" userId="5a87caf6b30614cd" providerId="LiveId" clId="{EEA9412B-3176-4D37-9EAC-DF2FF773A7C5}" dt="2020-05-08T19:05:09.596" v="732" actId="20577"/>
-          <ac:spMkLst>
-            <pc:docMk/>
-            <pc:sldMk cId="299227955" sldId="257"/>
-            <ac:spMk id="17" creationId="{BB6108BE-6442-4F30-B446-E37540FF8528}"/>
-          </ac:spMkLst>
-        </pc:spChg>
-        <pc:spChg chg="add mod">
-          <ac:chgData name="Dominick Lemas" userId="5a87caf6b30614cd" providerId="LiveId" clId="{EEA9412B-3176-4D37-9EAC-DF2FF773A7C5}" dt="2020-05-08T19:05:21.352" v="734" actId="1076"/>
-          <ac:spMkLst>
-            <pc:docMk/>
-            <pc:sldMk cId="299227955" sldId="257"/>
-            <ac:spMk id="18" creationId="{C28CAB42-34FF-495A-93AA-AB5270EF606C}"/>
-          </ac:spMkLst>
-        </pc:spChg>
-        <pc:cxnChg chg="add mod ord">
-          <ac:chgData name="Dominick Lemas" userId="5a87caf6b30614cd" providerId="LiveId" clId="{EEA9412B-3176-4D37-9EAC-DF2FF773A7C5}" dt="2020-05-08T19:02:56.659" v="542" actId="1036"/>
-          <ac:cxnSpMkLst>
-            <pc:docMk/>
-            <pc:sldMk cId="299227955" sldId="257"/>
-            <ac:cxnSpMk id="6" creationId="{16ECF1B3-796F-4AC9-89DD-BD2E2BA18A28}"/>
-          </ac:cxnSpMkLst>
-        </pc:cxnChg>
-      </pc:sldChg>
-      <pc:sldChg chg="modSp mod ord">
-        <pc:chgData name="Dominick Lemas" userId="5a87caf6b30614cd" providerId="LiveId" clId="{EEA9412B-3176-4D37-9EAC-DF2FF773A7C5}" dt="2020-05-08T19:34:06.604" v="1841" actId="20577"/>
-        <pc:sldMkLst>
-          <pc:docMk/>
-          <pc:sldMk cId="2764489915" sldId="258"/>
-        </pc:sldMkLst>
-        <pc:spChg chg="mod">
-          <ac:chgData name="Dominick Lemas" userId="5a87caf6b30614cd" providerId="LiveId" clId="{EEA9412B-3176-4D37-9EAC-DF2FF773A7C5}" dt="2020-05-08T19:34:06.604" v="1841" actId="20577"/>
-          <ac:spMkLst>
-            <pc:docMk/>
-            <pc:sldMk cId="2764489915" sldId="258"/>
-            <ac:spMk id="7" creationId="{B87D8751-7941-4330-AE48-FC961BC26B53}"/>
-          </ac:spMkLst>
-        </pc:spChg>
-      </pc:sldChg>
       <pc:sldChg chg="modSp mod">
-        <pc:chgData name="Dominick Lemas" userId="5a87caf6b30614cd" providerId="LiveId" clId="{EEA9412B-3176-4D37-9EAC-DF2FF773A7C5}" dt="2020-05-08T19:34:24.229" v="1843"/>
+        <pc:chgData name="Ballard,Hailey K" userId="23de628d-c853-4d3b-a32c-f06cb7215a98" providerId="ADAL" clId="{931B25A2-48B8-4348-A640-0986360107E4}" dt="2021-09-29T17:47:22.466" v="125" actId="1076"/>
         <pc:sldMkLst>
           <pc:docMk/>
           <pc:sldMk cId="3556988360" sldId="259"/>
         </pc:sldMkLst>
         <pc:spChg chg="mod">
-          <ac:chgData name="Dominick Lemas" userId="5a87caf6b30614cd" providerId="LiveId" clId="{EEA9412B-3176-4D37-9EAC-DF2FF773A7C5}" dt="2020-05-08T19:34:24.229" v="1843"/>
+          <ac:chgData name="Ballard,Hailey K" userId="23de628d-c853-4d3b-a32c-f06cb7215a98" providerId="ADAL" clId="{931B25A2-48B8-4348-A640-0986360107E4}" dt="2021-09-29T17:47:22.466" v="125" actId="1076"/>
           <ac:spMkLst>
             <pc:docMk/>
             <pc:sldMk cId="3556988360" sldId="259"/>
             <ac:spMk id="7" creationId="{B87D8751-7941-4330-AE48-FC961BC26B53}"/>
           </ac:spMkLst>
         </pc:spChg>
-      </pc:sldChg>
-      <pc:sldChg chg="addSp delSp modSp new mod">
-        <pc:chgData name="Dominick Lemas" userId="5a87caf6b30614cd" providerId="LiveId" clId="{EEA9412B-3176-4D37-9EAC-DF2FF773A7C5}" dt="2020-05-08T19:33:40.316" v="1821" actId="1582"/>
-        <pc:sldMkLst>
-          <pc:docMk/>
-          <pc:sldMk cId="3548851200" sldId="260"/>
-        </pc:sldMkLst>
-        <pc:spChg chg="del">
-          <ac:chgData name="Dominick Lemas" userId="5a87caf6b30614cd" providerId="LiveId" clId="{EEA9412B-3176-4D37-9EAC-DF2FF773A7C5}" dt="2020-05-08T19:06:38.045" v="789" actId="478"/>
-          <ac:spMkLst>
-            <pc:docMk/>
-            <pc:sldMk cId="3548851200" sldId="260"/>
-            <ac:spMk id="2" creationId="{D246845D-8186-47B7-844F-C549A5BC8B42}"/>
-          </ac:spMkLst>
-        </pc:spChg>
-        <pc:spChg chg="del">
-          <ac:chgData name="Dominick Lemas" userId="5a87caf6b30614cd" providerId="LiveId" clId="{EEA9412B-3176-4D37-9EAC-DF2FF773A7C5}" dt="2020-05-08T19:06:41.116" v="790" actId="478"/>
-          <ac:spMkLst>
-            <pc:docMk/>
-            <pc:sldMk cId="3548851200" sldId="260"/>
-            <ac:spMk id="3" creationId="{880A016E-01C8-4086-924F-C5FAF8999812}"/>
-          </ac:spMkLst>
-        </pc:spChg>
-        <pc:spChg chg="add mod">
-          <ac:chgData name="Dominick Lemas" userId="5a87caf6b30614cd" providerId="LiveId" clId="{EEA9412B-3176-4D37-9EAC-DF2FF773A7C5}" dt="2020-05-08T19:28:22.488" v="1067" actId="1076"/>
-          <ac:spMkLst>
-            <pc:docMk/>
-            <pc:sldMk cId="3548851200" sldId="260"/>
-            <ac:spMk id="4" creationId="{3DE5139B-CCFC-4079-A4C6-D8405D12CDDD}"/>
-          </ac:spMkLst>
-        </pc:spChg>
-        <pc:spChg chg="add mod">
-          <ac:chgData name="Dominick Lemas" userId="5a87caf6b30614cd" providerId="LiveId" clId="{EEA9412B-3176-4D37-9EAC-DF2FF773A7C5}" dt="2020-05-08T19:31:33.574" v="1473" actId="207"/>
-          <ac:spMkLst>
-            <pc:docMk/>
-            <pc:sldMk cId="3548851200" sldId="260"/>
-            <ac:spMk id="5" creationId="{1D1F6A55-A0C2-48A5-98D1-CDADE70B3558}"/>
-          </ac:spMkLst>
-        </pc:spChg>
-        <pc:spChg chg="add mod">
-          <ac:chgData name="Dominick Lemas" userId="5a87caf6b30614cd" providerId="LiveId" clId="{EEA9412B-3176-4D37-9EAC-DF2FF773A7C5}" dt="2020-05-08T19:29:02.987" v="1137" actId="122"/>
-          <ac:spMkLst>
-            <pc:docMk/>
-            <pc:sldMk cId="3548851200" sldId="260"/>
-            <ac:spMk id="6" creationId="{45B5F367-3A53-42C9-A93F-4931DC988199}"/>
-          </ac:spMkLst>
-        </pc:spChg>
-        <pc:spChg chg="add mod">
-          <ac:chgData name="Dominick Lemas" userId="5a87caf6b30614cd" providerId="LiveId" clId="{EEA9412B-3176-4D37-9EAC-DF2FF773A7C5}" dt="2020-05-08T19:33:23.436" v="1819" actId="115"/>
-          <ac:spMkLst>
-            <pc:docMk/>
-            <pc:sldMk cId="3548851200" sldId="260"/>
-            <ac:spMk id="7" creationId="{67629D44-55F4-4A08-A68B-3F040B1412EF}"/>
-          </ac:spMkLst>
-        </pc:spChg>
-        <pc:spChg chg="add mod">
-          <ac:chgData name="Dominick Lemas" userId="5a87caf6b30614cd" providerId="LiveId" clId="{EEA9412B-3176-4D37-9EAC-DF2FF773A7C5}" dt="2020-05-08T19:33:20.595" v="1818" actId="115"/>
-          <ac:spMkLst>
-            <pc:docMk/>
-            <pc:sldMk cId="3548851200" sldId="260"/>
-            <ac:spMk id="8" creationId="{5A8F99FA-85B7-48EC-AC75-3AE547785101}"/>
-          </ac:spMkLst>
-        </pc:spChg>
-        <pc:cxnChg chg="add mod">
-          <ac:chgData name="Dominick Lemas" userId="5a87caf6b30614cd" providerId="LiveId" clId="{EEA9412B-3176-4D37-9EAC-DF2FF773A7C5}" dt="2020-05-08T19:33:40.316" v="1821" actId="1582"/>
-          <ac:cxnSpMkLst>
-            <pc:docMk/>
-            <pc:sldMk cId="3548851200" sldId="260"/>
-            <ac:cxnSpMk id="10" creationId="{E115A471-F44B-448E-9213-6F7D7E52BCF6}"/>
-          </ac:cxnSpMkLst>
-        </pc:cxnChg>
-      </pc:sldChg>
-      <pc:sldChg chg="modSp new mod">
-        <pc:chgData name="Dominick Lemas" userId="5a87caf6b30614cd" providerId="LiveId" clId="{EEA9412B-3176-4D37-9EAC-DF2FF773A7C5}" dt="2020-05-08T19:35:48.911" v="2220" actId="20577"/>
-        <pc:sldMkLst>
-          <pc:docMk/>
-          <pc:sldMk cId="3801195063" sldId="261"/>
-        </pc:sldMkLst>
-        <pc:spChg chg="mod">
-          <ac:chgData name="Dominick Lemas" userId="5a87caf6b30614cd" providerId="LiveId" clId="{EEA9412B-3176-4D37-9EAC-DF2FF773A7C5}" dt="2020-05-08T19:34:37.870" v="1858" actId="20577"/>
-          <ac:spMkLst>
-            <pc:docMk/>
-            <pc:sldMk cId="3801195063" sldId="261"/>
-            <ac:spMk id="2" creationId="{AC4295F5-96B0-4534-A7C1-DF9F2728E176}"/>
-          </ac:spMkLst>
-        </pc:spChg>
-        <pc:spChg chg="mod">
-          <ac:chgData name="Dominick Lemas" userId="5a87caf6b30614cd" providerId="LiveId" clId="{EEA9412B-3176-4D37-9EAC-DF2FF773A7C5}" dt="2020-05-08T19:35:48.911" v="2220" actId="20577"/>
-          <ac:spMkLst>
-            <pc:docMk/>
-            <pc:sldMk cId="3801195063" sldId="261"/>
-            <ac:spMk id="3" creationId="{DC95A75C-26C0-4E12-9511-7AC606F04AEA}"/>
-          </ac:spMkLst>
-        </pc:spChg>
-      </pc:sldChg>
-      <pc:sldChg chg="addSp modSp mod">
-        <pc:chgData name="Dominick Lemas" userId="5a87caf6b30614cd" providerId="LiveId" clId="{EEA9412B-3176-4D37-9EAC-DF2FF773A7C5}" dt="2020-05-08T19:43:35.761" v="2722" actId="20577"/>
-        <pc:sldMkLst>
-          <pc:docMk/>
-          <pc:sldMk cId="450799333" sldId="262"/>
-        </pc:sldMkLst>
-        <pc:spChg chg="mod">
-          <ac:chgData name="Dominick Lemas" userId="5a87caf6b30614cd" providerId="LiveId" clId="{EEA9412B-3176-4D37-9EAC-DF2FF773A7C5}" dt="2020-05-08T19:39:14.263" v="2678" actId="1076"/>
-          <ac:spMkLst>
-            <pc:docMk/>
-            <pc:sldMk cId="450799333" sldId="262"/>
-            <ac:spMk id="2" creationId="{AC4295F5-96B0-4534-A7C1-DF9F2728E176}"/>
-          </ac:spMkLst>
-        </pc:spChg>
-        <pc:spChg chg="mod">
-          <ac:chgData name="Dominick Lemas" userId="5a87caf6b30614cd" providerId="LiveId" clId="{EEA9412B-3176-4D37-9EAC-DF2FF773A7C5}" dt="2020-05-08T19:40:02.062" v="2706" actId="20577"/>
-          <ac:spMkLst>
-            <pc:docMk/>
-            <pc:sldMk cId="450799333" sldId="262"/>
-            <ac:spMk id="3" creationId="{DC95A75C-26C0-4E12-9511-7AC606F04AEA}"/>
-          </ac:spMkLst>
-        </pc:spChg>
-        <pc:spChg chg="add mod">
-          <ac:chgData name="Dominick Lemas" userId="5a87caf6b30614cd" providerId="LiveId" clId="{EEA9412B-3176-4D37-9EAC-DF2FF773A7C5}" dt="2020-05-08T19:43:35.761" v="2722" actId="20577"/>
-          <ac:spMkLst>
-            <pc:docMk/>
-            <pc:sldMk cId="450799333" sldId="262"/>
-            <ac:spMk id="6" creationId="{0493134F-B7B0-4042-AA22-B5E6975E41EA}"/>
-          </ac:spMkLst>
-        </pc:spChg>
-        <pc:graphicFrameChg chg="add mod modGraphic">
-          <ac:chgData name="Dominick Lemas" userId="5a87caf6b30614cd" providerId="LiveId" clId="{EEA9412B-3176-4D37-9EAC-DF2FF773A7C5}" dt="2020-05-08T19:39:19.358" v="2680" actId="1076"/>
+        <pc:graphicFrameChg chg="mod modGraphic">
+          <ac:chgData name="Ballard,Hailey K" userId="23de628d-c853-4d3b-a32c-f06cb7215a98" providerId="ADAL" clId="{931B25A2-48B8-4348-A640-0986360107E4}" dt="2021-09-29T17:47:20.221" v="124" actId="1076"/>
           <ac:graphicFrameMkLst>
             <pc:docMk/>
-            <pc:sldMk cId="450799333" sldId="262"/>
-            <ac:graphicFrameMk id="4" creationId="{A93E0570-D1FA-4DD1-B3BD-2B7CFB871850}"/>
+            <pc:sldMk cId="3556988360" sldId="259"/>
+            <ac:graphicFrameMk id="5" creationId="{FEFE7B45-6B60-452A-97A9-EB84E48A19A6}"/>
           </ac:graphicFrameMkLst>
         </pc:graphicFrameChg>
       </pc:sldChg>
@@ -541,7 +243,7 @@
           <a:p>
             <a:fld id="{FC26F78C-B1A4-47C1-AFCC-B1D60184EAD7}" type="datetimeFigureOut">
               <a:rPr lang="en-US" smtClean="0"/>
-              <a:t>9/27/2021</a:t>
+              <a:t>9/29/2021</a:t>
             </a:fld>
             <a:endParaRPr lang="en-US"/>
           </a:p>
@@ -605,38 +307,37 @@
           <a:p>
             <a:pPr lvl="0"/>
             <a:r>
-              <a:rPr lang="en-US" smtClean="0"/>
+              <a:rPr lang="en-US"/>
               <a:t>Edit Master text styles</a:t>
             </a:r>
           </a:p>
           <a:p>
             <a:pPr lvl="1"/>
             <a:r>
-              <a:rPr lang="en-US" smtClean="0"/>
+              <a:rPr lang="en-US"/>
               <a:t>Second level</a:t>
             </a:r>
           </a:p>
           <a:p>
             <a:pPr lvl="2"/>
             <a:r>
-              <a:rPr lang="en-US" smtClean="0"/>
+              <a:rPr lang="en-US"/>
               <a:t>Third level</a:t>
             </a:r>
           </a:p>
           <a:p>
             <a:pPr lvl="3"/>
             <a:r>
-              <a:rPr lang="en-US" smtClean="0"/>
+              <a:rPr lang="en-US"/>
               <a:t>Fourth level</a:t>
             </a:r>
           </a:p>
           <a:p>
             <a:pPr lvl="4"/>
             <a:r>
-              <a:rPr lang="en-US" smtClean="0"/>
+              <a:rPr lang="en-US"/>
               <a:t>Fifth level</a:t>
             </a:r>
-            <a:endParaRPr lang="en-US"/>
           </a:p>
         </p:txBody>
       </p:sp>
@@ -1040,7 +741,7 @@
           <a:p>
             <a:fld id="{D42A5135-48D3-4D79-94BD-3DE4D0D8DD73}" type="datetimeFigureOut">
               <a:rPr lang="en-US" smtClean="0"/>
-              <a:t>9/27/2021</a:t>
+              <a:t>9/29/2021</a:t>
             </a:fld>
             <a:endParaRPr lang="en-US"/>
           </a:p>
@@ -1238,7 +939,7 @@
           <a:p>
             <a:fld id="{D42A5135-48D3-4D79-94BD-3DE4D0D8DD73}" type="datetimeFigureOut">
               <a:rPr lang="en-US" smtClean="0"/>
-              <a:t>9/27/2021</a:t>
+              <a:t>9/29/2021</a:t>
             </a:fld>
             <a:endParaRPr lang="en-US"/>
           </a:p>
@@ -1446,7 +1147,7 @@
           <a:p>
             <a:fld id="{D42A5135-48D3-4D79-94BD-3DE4D0D8DD73}" type="datetimeFigureOut">
               <a:rPr lang="en-US" smtClean="0"/>
-              <a:t>9/27/2021</a:t>
+              <a:t>9/29/2021</a:t>
             </a:fld>
             <a:endParaRPr lang="en-US"/>
           </a:p>
@@ -1644,7 +1345,7 @@
           <a:p>
             <a:fld id="{D42A5135-48D3-4D79-94BD-3DE4D0D8DD73}" type="datetimeFigureOut">
               <a:rPr lang="en-US" smtClean="0"/>
-              <a:t>9/27/2021</a:t>
+              <a:t>9/29/2021</a:t>
             </a:fld>
             <a:endParaRPr lang="en-US"/>
           </a:p>
@@ -1919,7 +1620,7 @@
           <a:p>
             <a:fld id="{D42A5135-48D3-4D79-94BD-3DE4D0D8DD73}" type="datetimeFigureOut">
               <a:rPr lang="en-US" smtClean="0"/>
-              <a:t>9/27/2021</a:t>
+              <a:t>9/29/2021</a:t>
             </a:fld>
             <a:endParaRPr lang="en-US"/>
           </a:p>
@@ -2184,7 +1885,7 @@
           <a:p>
             <a:fld id="{D42A5135-48D3-4D79-94BD-3DE4D0D8DD73}" type="datetimeFigureOut">
               <a:rPr lang="en-US" smtClean="0"/>
-              <a:t>9/27/2021</a:t>
+              <a:t>9/29/2021</a:t>
             </a:fld>
             <a:endParaRPr lang="en-US"/>
           </a:p>
@@ -2596,7 +2297,7 @@
           <a:p>
             <a:fld id="{D42A5135-48D3-4D79-94BD-3DE4D0D8DD73}" type="datetimeFigureOut">
               <a:rPr lang="en-US" smtClean="0"/>
-              <a:t>9/27/2021</a:t>
+              <a:t>9/29/2021</a:t>
             </a:fld>
             <a:endParaRPr lang="en-US"/>
           </a:p>
@@ -2737,7 +2438,7 @@
           <a:p>
             <a:fld id="{D42A5135-48D3-4D79-94BD-3DE4D0D8DD73}" type="datetimeFigureOut">
               <a:rPr lang="en-US" smtClean="0"/>
-              <a:t>9/27/2021</a:t>
+              <a:t>9/29/2021</a:t>
             </a:fld>
             <a:endParaRPr lang="en-US"/>
           </a:p>
@@ -2850,7 +2551,7 @@
           <a:p>
             <a:fld id="{D42A5135-48D3-4D79-94BD-3DE4D0D8DD73}" type="datetimeFigureOut">
               <a:rPr lang="en-US" smtClean="0"/>
-              <a:t>9/27/2021</a:t>
+              <a:t>9/29/2021</a:t>
             </a:fld>
             <a:endParaRPr lang="en-US"/>
           </a:p>
@@ -3161,7 +2862,7 @@
           <a:p>
             <a:fld id="{D42A5135-48D3-4D79-94BD-3DE4D0D8DD73}" type="datetimeFigureOut">
               <a:rPr lang="en-US" smtClean="0"/>
-              <a:t>9/27/2021</a:t>
+              <a:t>9/29/2021</a:t>
             </a:fld>
             <a:endParaRPr lang="en-US"/>
           </a:p>
@@ -3449,7 +3150,7 @@
           <a:p>
             <a:fld id="{D42A5135-48D3-4D79-94BD-3DE4D0D8DD73}" type="datetimeFigureOut">
               <a:rPr lang="en-US" smtClean="0"/>
-              <a:t>9/27/2021</a:t>
+              <a:t>9/29/2021</a:t>
             </a:fld>
             <a:endParaRPr lang="en-US"/>
           </a:p>
@@ -3690,7 +3391,7 @@
           <a:p>
             <a:fld id="{D42A5135-48D3-4D79-94BD-3DE4D0D8DD73}" type="datetimeFigureOut">
               <a:rPr lang="en-US" smtClean="0"/>
-              <a:t>9/27/2021</a:t>
+              <a:t>9/29/2021</a:t>
             </a:fld>
             <a:endParaRPr lang="en-US"/>
           </a:p>
@@ -4266,9 +3967,7 @@
           <p:cNvGraphicFramePr>
             <a:graphicFrameLocks noGrp="1"/>
           </p:cNvGraphicFramePr>
-          <p:nvPr>
-            <p:extLst/>
-          </p:nvPr>
+          <p:nvPr/>
         </p:nvGraphicFramePr>
         <p:xfrm>
           <a:off x="381000" y="1219200"/>
@@ -5201,14 +4900,6 @@
   <p:clrMapOvr>
     <a:masterClrMapping/>
   </p:clrMapOvr>
-  <mc:AlternateContent xmlns:mc="http://schemas.openxmlformats.org/markup-compatibility/2006">
-    <mc:Choice xmlns:p14="http://schemas.microsoft.com/office/powerpoint/2010/main" Requires="p14">
-      <p:transition spd="slow" p14:dur="2000"/>
-    </mc:Choice>
-    <mc:Fallback>
-      <p:transition spd="slow"/>
-    </mc:Fallback>
-  </mc:AlternateContent>
 </p:sld>
 </file>
 
@@ -8560,13 +8251,7 @@
               <a:rPr lang="en-US" sz="2000" dirty="0">
                 <a:latin typeface="Arial Black" panose="020B0A04020102020204" pitchFamily="34" charset="0"/>
               </a:rPr>
-              <a:t>UF Health Mom-Baby EHR: Data </a:t>
-            </a:r>
-            <a:r>
-              <a:rPr lang="en-US" sz="2000" dirty="0" smtClean="0">
-                <a:latin typeface="Arial Black" panose="020B0A04020102020204" pitchFamily="34" charset="0"/>
-              </a:rPr>
-              <a:t>Dictionary (09/2021, version 1.0)</a:t>
+              <a:t>UF Health Mom-Baby EHR: Data Dictionary (09/2021, version 1.0)</a:t>
             </a:r>
             <a:endParaRPr lang="en-US" sz="2000" b="1" cap="all" dirty="0">
               <a:solidFill>
@@ -8681,14 +8366,6 @@
   <p:clrMapOvr>
     <a:masterClrMapping/>
   </p:clrMapOvr>
-  <mc:AlternateContent xmlns:mc="http://schemas.openxmlformats.org/markup-compatibility/2006">
-    <mc:Choice xmlns:p14="http://schemas.microsoft.com/office/powerpoint/2010/main" Requires="p14">
-      <p:transition spd="slow" p14:dur="2000"/>
-    </mc:Choice>
-    <mc:Fallback>
-      <p:transition spd="slow"/>
-    </mc:Fallback>
-  </mc:AlternateContent>
 </p:sld>
 </file>
 
@@ -9864,14 +9541,6 @@
   <p:clrMapOvr>
     <a:masterClrMapping/>
   </p:clrMapOvr>
-  <mc:AlternateContent xmlns:mc="http://schemas.openxmlformats.org/markup-compatibility/2006">
-    <mc:Choice xmlns:p14="http://schemas.microsoft.com/office/powerpoint/2010/main" Requires="p14">
-      <p:transition spd="slow" p14:dur="2000"/>
-    </mc:Choice>
-    <mc:Fallback>
-      <p:transition spd="slow"/>
-    </mc:Fallback>
-  </mc:AlternateContent>
 </p:sld>
 </file>
 
@@ -11261,11 +10930,17 @@
           <p:cNvGraphicFramePr>
             <a:graphicFrameLocks noGrp="1"/>
           </p:cNvGraphicFramePr>
-          <p:nvPr/>
+          <p:nvPr>
+            <p:extLst>
+              <p:ext uri="{D42A27DB-BD31-4B8C-83A1-F6EECF244321}">
+                <p14:modId xmlns:p14="http://schemas.microsoft.com/office/powerpoint/2010/main" val="2607981338"/>
+              </p:ext>
+            </p:extLst>
+          </p:nvPr>
         </p:nvGraphicFramePr>
         <p:xfrm>
           <a:off x="874295" y="1014574"/>
-          <a:ext cx="7978274" cy="4038600"/>
+          <a:ext cx="7978274" cy="5039360"/>
         </p:xfrm>
         <a:graphic>
           <a:graphicData uri="http://schemas.openxmlformats.org/drawingml/2006/table">
@@ -11482,6 +11157,16 @@
                       </a:r>
                       <a:endParaRPr lang="en-US" sz="1200" dirty="0"/>
                     </a:p>
+                    <a:p>
+                      <a:pPr marL="285750" indent="-285750">
+                        <a:buFont typeface="Arial" panose="020B0604020202020204" pitchFamily="34" charset="0"/>
+                        <a:buChar char="•"/>
+                      </a:pPr>
+                      <a:r>
+                        <a:rPr lang="en-US" sz="1200" dirty="0"/>
+                        <a:t>BMI</a:t>
+                      </a:r>
+                    </a:p>
                   </a:txBody>
                   <a:tcPr/>
                 </a:tc>
@@ -11682,7 +11367,40 @@
                     <a:bodyPr/>
                     <a:lstStyle/>
                     <a:p>
-                      <a:endParaRPr lang="en-US" sz="1200" dirty="0"/>
+                      <a:pPr marL="171450" indent="-171450">
+                        <a:buFont typeface="Arial" panose="020B0604020202020204" pitchFamily="34" charset="0"/>
+                        <a:buChar char="•"/>
+                      </a:pPr>
+                      <a:r>
+                        <a:rPr lang="en-US" sz="1200" dirty="0"/>
+                        <a:t>IP Antibiotics (date, type, med therapy class, </a:t>
+                      </a:r>
+                      <a:r>
+                        <a:rPr lang="en-US" sz="1200" dirty="0" err="1"/>
+                        <a:t>Rxnrom</a:t>
+                      </a:r>
+                      <a:r>
+                        <a:rPr lang="en-US" sz="1200" dirty="0"/>
+                        <a:t> code)</a:t>
+                      </a:r>
+                    </a:p>
+                    <a:p>
+                      <a:pPr marL="171450" indent="-171450">
+                        <a:buFont typeface="Arial" panose="020B0604020202020204" pitchFamily="34" charset="0"/>
+                        <a:buChar char="•"/>
+                      </a:pPr>
+                      <a:r>
+                        <a:rPr lang="en-US" sz="1200" dirty="0"/>
+                        <a:t>OP antibiotics (date, type, med therapy class, </a:t>
+                      </a:r>
+                      <a:r>
+                        <a:rPr lang="en-US" sz="1200" dirty="0" err="1"/>
+                        <a:t>Rxnrom</a:t>
+                      </a:r>
+                      <a:r>
+                        <a:rPr lang="en-US" sz="1200" dirty="0"/>
+                        <a:t> code)</a:t>
+                      </a:r>
                     </a:p>
                   </a:txBody>
                   <a:tcPr/>
@@ -11950,14 +11668,14 @@
           <p:nvPr>
             <p:extLst>
               <p:ext uri="{D42A27DB-BD31-4B8C-83A1-F6EECF244321}">
-                <p14:modId xmlns:p14="http://schemas.microsoft.com/office/powerpoint/2010/main" val="3330880355"/>
+                <p14:modId xmlns:p14="http://schemas.microsoft.com/office/powerpoint/2010/main" val="4079053232"/>
               </p:ext>
             </p:extLst>
           </p:nvPr>
         </p:nvGraphicFramePr>
         <p:xfrm>
-          <a:off x="874295" y="1014574"/>
-          <a:ext cx="7978274" cy="4038600"/>
+          <a:off x="988155" y="804232"/>
+          <a:ext cx="9365943" cy="5728118"/>
         </p:xfrm>
         <a:graphic>
           <a:graphicData uri="http://schemas.openxmlformats.org/drawingml/2006/table">
@@ -11966,28 +11684,28 @@
                 <a:tableStyleId>{5C22544A-7EE6-4342-B048-85BDC9FD1C3A}</a:tableStyleId>
               </a:tblPr>
               <a:tblGrid>
-                <a:gridCol w="1882274">
+                <a:gridCol w="1981634">
                   <a:extLst>
                     <a:ext uri="{9D8B030D-6E8A-4147-A177-3AD203B41FA5}">
                       <a16:colId xmlns:a16="http://schemas.microsoft.com/office/drawing/2014/main" val="3104375195"/>
                     </a:ext>
                   </a:extLst>
                 </a:gridCol>
-                <a:gridCol w="2184400">
+                <a:gridCol w="3412412">
                   <a:extLst>
                     <a:ext uri="{9D8B030D-6E8A-4147-A177-3AD203B41FA5}">
                       <a16:colId xmlns:a16="http://schemas.microsoft.com/office/drawing/2014/main" val="3449709606"/>
                     </a:ext>
                   </a:extLst>
                 </a:gridCol>
-                <a:gridCol w="1879600">
+                <a:gridCol w="1960810">
                   <a:extLst>
                     <a:ext uri="{9D8B030D-6E8A-4147-A177-3AD203B41FA5}">
                       <a16:colId xmlns:a16="http://schemas.microsoft.com/office/drawing/2014/main" val="1547008946"/>
                     </a:ext>
                   </a:extLst>
                 </a:gridCol>
-                <a:gridCol w="2032000">
+                <a:gridCol w="2011087">
                   <a:extLst>
                     <a:ext uri="{9D8B030D-6E8A-4147-A177-3AD203B41FA5}">
                       <a16:colId xmlns:a16="http://schemas.microsoft.com/office/drawing/2014/main" val="1891596437"/>
@@ -11995,7 +11713,7 @@
                   </a:extLst>
                 </a:gridCol>
               </a:tblGrid>
-              <a:tr h="370840">
+              <a:tr h="407199">
                 <a:tc>
                   <a:txBody>
                     <a:bodyPr/>
@@ -12054,7 +11772,7 @@
                   </a:ext>
                 </a:extLst>
               </a:tr>
-              <a:tr h="370840">
+              <a:tr h="570078">
                 <a:tc>
                   <a:txBody>
                     <a:bodyPr/>
@@ -12062,7 +11780,7 @@
                     <a:p>
                       <a:r>
                         <a:rPr lang="en-US" sz="1200" dirty="0"/>
-                        <a:t>Demographics</a:t>
+                        <a:t>Maternal Demographics</a:t>
                       </a:r>
                     </a:p>
                   </a:txBody>
@@ -12131,7 +11849,7 @@
                   </a:ext>
                 </a:extLst>
               </a:tr>
-              <a:tr h="370840">
+              <a:tr h="570078">
                 <a:tc>
                   <a:txBody>
                     <a:bodyPr/>
@@ -12139,7 +11857,7 @@
                     <a:p>
                       <a:r>
                         <a:rPr lang="en-US" sz="1200" dirty="0"/>
-                        <a:t>Vital Signs</a:t>
+                        <a:t>Infant Demographics</a:t>
                       </a:r>
                     </a:p>
                   </a:txBody>
@@ -12156,7 +11874,7 @@
                       </a:pPr>
                       <a:r>
                         <a:rPr lang="en-US" sz="1200" dirty="0"/>
-                        <a:t>Blood pressure</a:t>
+                        <a:t>Pediatric Gestational Age</a:t>
                       </a:r>
                     </a:p>
                     <a:p>
@@ -12166,13 +11884,18 @@
                       </a:pPr>
                       <a:r>
                         <a:rPr lang="en-US" sz="1200" dirty="0"/>
-                        <a:t>Height/</a:t>
+                        <a:t>Sex</a:t>
                       </a:r>
+                    </a:p>
+                    <a:p>
+                      <a:pPr marL="285750" indent="-285750">
+                        <a:buFont typeface="Arial" panose="020B0604020202020204" pitchFamily="34" charset="0"/>
+                        <a:buChar char="•"/>
+                      </a:pPr>
                       <a:r>
-                        <a:rPr lang="en-US" sz="1200" dirty="0" err="1"/>
-                        <a:t>wt</a:t>
+                        <a:rPr lang="en-US" sz="1200" dirty="0"/>
+                        <a:t>Race/Ethnicity</a:t>
                       </a:r>
-                      <a:endParaRPr lang="en-US" sz="1200" dirty="0"/>
                     </a:p>
                   </a:txBody>
                   <a:tcPr/>
@@ -12191,6 +11914,9 @@
                   <a:txBody>
                     <a:bodyPr/>
                     <a:lstStyle/>
+                    <a:p>
+                      <a:endParaRPr lang="en-US" sz="1200" dirty="0"/>
+                    </a:p>
                     <a:p>
                       <a:endParaRPr lang="en-US" sz="1200" dirty="0"/>
                     </a:p>
@@ -12203,7 +11929,7 @@
                   </a:ext>
                 </a:extLst>
               </a:tr>
-              <a:tr h="370840">
+              <a:tr h="732958">
                 <a:tc>
                   <a:txBody>
                     <a:bodyPr/>
@@ -12211,13 +11937,7 @@
                     <a:p>
                       <a:r>
                         <a:rPr lang="en-US" sz="1200" dirty="0"/>
-                        <a:t>Outpatient encounters</a:t>
-                      </a:r>
-                    </a:p>
-                    <a:p>
-                      <a:r>
-                        <a:rPr lang="en-US" sz="1200" dirty="0"/>
-                        <a:t>ICD9/10 codes </a:t>
+                        <a:t>Maternal Vital Signs</a:t>
                       </a:r>
                     </a:p>
                   </a:txBody>
@@ -12234,7 +11954,7 @@
                       </a:pPr>
                       <a:r>
                         <a:rPr lang="en-US" sz="1200" dirty="0"/>
-                        <a:t>asthma: </a:t>
+                        <a:t>Blood pressure</a:t>
                       </a:r>
                     </a:p>
                     <a:p>
@@ -12244,7 +11964,35 @@
                       </a:pPr>
                       <a:r>
                         <a:rPr lang="en-US" sz="1200" dirty="0"/>
-                        <a:t>Obesity</a:t>
+                        <a:t>Height (in) &amp; height (cm)</a:t>
+                      </a:r>
+                    </a:p>
+                    <a:p>
+                      <a:pPr marL="285750" indent="-285750">
+                        <a:buFont typeface="Arial" panose="020B0604020202020204" pitchFamily="34" charset="0"/>
+                        <a:buChar char="•"/>
+                      </a:pPr>
+                      <a:r>
+                        <a:rPr lang="en-US" sz="1200" dirty="0"/>
+                        <a:t>Weight (kgs) &amp; weight (</a:t>
+                      </a:r>
+                      <a:r>
+                        <a:rPr lang="en-US" sz="1200" dirty="0" err="1"/>
+                        <a:t>lbs</a:t>
+                      </a:r>
+                      <a:r>
+                        <a:rPr lang="en-US" sz="1200" dirty="0"/>
+                        <a:t>)</a:t>
+                      </a:r>
+                    </a:p>
+                    <a:p>
+                      <a:pPr marL="285750" indent="-285750">
+                        <a:buFont typeface="Arial" panose="020B0604020202020204" pitchFamily="34" charset="0"/>
+                        <a:buChar char="•"/>
+                      </a:pPr>
+                      <a:r>
+                        <a:rPr lang="en-US" sz="1200" dirty="0"/>
+                        <a:t>BMI</a:t>
                       </a:r>
                     </a:p>
                   </a:txBody>
@@ -12276,7 +12024,137 @@
                   </a:ext>
                 </a:extLst>
               </a:tr>
-              <a:tr h="370840">
+              <a:tr h="570078">
+                <a:tc>
+                  <a:txBody>
+                    <a:bodyPr/>
+                    <a:lstStyle/>
+                    <a:p>
+                      <a:r>
+                        <a:rPr lang="en-US" sz="1200" dirty="0"/>
+                        <a:t>Infant Vital Signs</a:t>
+                      </a:r>
+                    </a:p>
+                  </a:txBody>
+                  <a:tcPr/>
+                </a:tc>
+                <a:tc>
+                  <a:txBody>
+                    <a:bodyPr/>
+                    <a:lstStyle/>
+                    <a:p>
+                      <a:pPr marL="285750" indent="-285750">
+                        <a:buFont typeface="Arial" panose="020B0604020202020204" pitchFamily="34" charset="0"/>
+                        <a:buChar char="•"/>
+                      </a:pPr>
+                      <a:r>
+                        <a:rPr lang="en-US" sz="1200" dirty="0"/>
+                        <a:t>Birth Weight (g)</a:t>
+                      </a:r>
+                    </a:p>
+                  </a:txBody>
+                  <a:tcPr/>
+                </a:tc>
+                <a:tc>
+                  <a:txBody>
+                    <a:bodyPr/>
+                    <a:lstStyle/>
+                    <a:p>
+                      <a:endParaRPr lang="en-US" sz="1200" dirty="0"/>
+                    </a:p>
+                  </a:txBody>
+                  <a:tcPr/>
+                </a:tc>
+                <a:tc>
+                  <a:txBody>
+                    <a:bodyPr/>
+                    <a:lstStyle/>
+                    <a:p>
+                      <a:endParaRPr lang="en-US" sz="1200" dirty="0"/>
+                    </a:p>
+                  </a:txBody>
+                  <a:tcPr/>
+                </a:tc>
+                <a:extLst>
+                  <a:ext uri="{0D108BD9-81ED-4DB2-BD59-A6C34878D82A}">
+                    <a16:rowId xmlns:a16="http://schemas.microsoft.com/office/drawing/2014/main" val="3589019905"/>
+                  </a:ext>
+                </a:extLst>
+              </a:tr>
+              <a:tr h="407199">
+                <a:tc>
+                  <a:txBody>
+                    <a:bodyPr/>
+                    <a:lstStyle/>
+                    <a:p>
+                      <a:r>
+                        <a:rPr lang="en-US" sz="1200" dirty="0"/>
+                        <a:t>Outpatient encounters</a:t>
+                      </a:r>
+                    </a:p>
+                    <a:p>
+                      <a:r>
+                        <a:rPr lang="en-US" sz="1200" dirty="0"/>
+                        <a:t>ICD9/10 codes </a:t>
+                      </a:r>
+                    </a:p>
+                  </a:txBody>
+                  <a:tcPr/>
+                </a:tc>
+                <a:tc>
+                  <a:txBody>
+                    <a:bodyPr/>
+                    <a:lstStyle/>
+                    <a:p>
+                      <a:pPr marL="285750" indent="-285750">
+                        <a:buFont typeface="Arial" panose="020B0604020202020204" pitchFamily="34" charset="0"/>
+                        <a:buChar char="•"/>
+                      </a:pPr>
+                      <a:r>
+                        <a:rPr lang="en-US" sz="1200" dirty="0"/>
+                        <a:t>asthma: </a:t>
+                      </a:r>
+                    </a:p>
+                    <a:p>
+                      <a:pPr marL="285750" indent="-285750">
+                        <a:buFont typeface="Arial" panose="020B0604020202020204" pitchFamily="34" charset="0"/>
+                        <a:buChar char="•"/>
+                      </a:pPr>
+                      <a:r>
+                        <a:rPr lang="en-US" sz="1200" dirty="0"/>
+                        <a:t>Obesity</a:t>
+                      </a:r>
+                    </a:p>
+                  </a:txBody>
+                  <a:tcPr/>
+                </a:tc>
+                <a:tc>
+                  <a:txBody>
+                    <a:bodyPr/>
+                    <a:lstStyle/>
+                    <a:p>
+                      <a:endParaRPr lang="en-US" sz="1200" dirty="0"/>
+                    </a:p>
+                  </a:txBody>
+                  <a:tcPr/>
+                </a:tc>
+                <a:tc>
+                  <a:txBody>
+                    <a:bodyPr/>
+                    <a:lstStyle/>
+                    <a:p>
+                      <a:endParaRPr lang="en-US" sz="1200" dirty="0"/>
+                    </a:p>
+                  </a:txBody>
+                  <a:tcPr/>
+                </a:tc>
+                <a:extLst>
+                  <a:ext uri="{0D108BD9-81ED-4DB2-BD59-A6C34878D82A}">
+                    <a16:rowId xmlns:a16="http://schemas.microsoft.com/office/drawing/2014/main" val="1066536024"/>
+                  </a:ext>
+                </a:extLst>
+              </a:tr>
+              <a:tr h="407199">
                 <a:tc>
                   <a:txBody>
                     <a:bodyPr/>
@@ -12323,112 +12201,6 @@
                         <a:t>ICD9/10 codes</a:t>
                       </a:r>
                     </a:p>
-                    <a:p>
-                      <a:endParaRPr lang="en-US" sz="1200" dirty="0"/>
-                    </a:p>
-                  </a:txBody>
-                  <a:tcPr/>
-                </a:tc>
-                <a:tc>
-                  <a:txBody>
-                    <a:bodyPr/>
-                    <a:lstStyle/>
-                    <a:p>
-                      <a:endParaRPr lang="en-US" sz="1200" dirty="0"/>
-                    </a:p>
-                  </a:txBody>
-                  <a:tcPr/>
-                </a:tc>
-                <a:tc>
-                  <a:txBody>
-                    <a:bodyPr/>
-                    <a:lstStyle/>
-                    <a:p>
-                      <a:endParaRPr lang="en-US" sz="1200" dirty="0"/>
-                    </a:p>
-                  </a:txBody>
-                  <a:tcPr/>
-                </a:tc>
-                <a:extLst>
-                  <a:ext uri="{0D108BD9-81ED-4DB2-BD59-A6C34878D82A}">
-                    <a16:rowId xmlns:a16="http://schemas.microsoft.com/office/drawing/2014/main" val="3589019905"/>
-                  </a:ext>
-                </a:extLst>
-              </a:tr>
-              <a:tr h="370840">
-                <a:tc>
-                  <a:txBody>
-                    <a:bodyPr/>
-                    <a:lstStyle/>
-                    <a:p>
-                      <a:r>
-                        <a:rPr lang="en-US" sz="1200" dirty="0"/>
-                        <a:t>Medication</a:t>
-                      </a:r>
-                    </a:p>
-                  </a:txBody>
-                  <a:tcPr/>
-                </a:tc>
-                <a:tc>
-                  <a:txBody>
-                    <a:bodyPr/>
-                    <a:lstStyle/>
-                    <a:p>
-                      <a:endParaRPr lang="en-US" sz="1200" dirty="0"/>
-                    </a:p>
-                  </a:txBody>
-                  <a:tcPr/>
-                </a:tc>
-                <a:tc>
-                  <a:txBody>
-                    <a:bodyPr/>
-                    <a:lstStyle/>
-                    <a:p>
-                      <a:endParaRPr lang="en-US" sz="1200" dirty="0"/>
-                    </a:p>
-                  </a:txBody>
-                  <a:tcPr/>
-                </a:tc>
-                <a:tc>
-                  <a:txBody>
-                    <a:bodyPr/>
-                    <a:lstStyle/>
-                    <a:p>
-                      <a:endParaRPr lang="en-US" sz="1200" dirty="0"/>
-                    </a:p>
-                  </a:txBody>
-                  <a:tcPr/>
-                </a:tc>
-                <a:extLst>
-                  <a:ext uri="{0D108BD9-81ED-4DB2-BD59-A6C34878D82A}">
-                    <a16:rowId xmlns:a16="http://schemas.microsoft.com/office/drawing/2014/main" val="1066536024"/>
-                  </a:ext>
-                </a:extLst>
-              </a:tr>
-              <a:tr h="370840">
-                <a:tc>
-                  <a:txBody>
-                    <a:bodyPr/>
-                    <a:lstStyle/>
-                    <a:p>
-                      <a:r>
-                        <a:rPr lang="en-US" sz="1200" dirty="0"/>
-                        <a:t>Problem List</a:t>
-                      </a:r>
-                    </a:p>
-                  </a:txBody>
-                  <a:tcPr/>
-                </a:tc>
-                <a:tc>
-                  <a:txBody>
-                    <a:bodyPr/>
-                    <a:lstStyle/>
-                    <a:p>
-                      <a:r>
-                        <a:rPr lang="en-US" sz="1200" dirty="0"/>
-                        <a:t>ICD9/10: depression, CVD, cancer</a:t>
-                      </a:r>
-                    </a:p>
                   </a:txBody>
                   <a:tcPr/>
                 </a:tc>
@@ -12458,7 +12230,7 @@
                   </a:ext>
                 </a:extLst>
               </a:tr>
-              <a:tr h="370840">
+              <a:tr h="895837">
                 <a:tc>
                   <a:txBody>
                     <a:bodyPr/>
@@ -12466,7 +12238,7 @@
                     <a:p>
                       <a:r>
                         <a:rPr lang="en-US" sz="1200" dirty="0"/>
-                        <a:t>Free Text</a:t>
+                        <a:t>Medication</a:t>
                       </a:r>
                     </a:p>
                   </a:txBody>
@@ -12477,9 +12249,52 @@
                     <a:bodyPr/>
                     <a:lstStyle/>
                     <a:p>
+                      <a:pPr marL="171450" indent="-171450">
+                        <a:buFont typeface="Arial" panose="020B0604020202020204" pitchFamily="34" charset="0"/>
+                        <a:buChar char="•"/>
+                      </a:pPr>
                       <a:r>
                         <a:rPr lang="en-US" sz="1200" dirty="0"/>
-                        <a:t>Clinical Notes</a:t>
+                        <a:t>IP Antibiotics (date, type, med therapy class, </a:t>
+                      </a:r>
+                      <a:r>
+                        <a:rPr lang="en-US" sz="1200" dirty="0" err="1"/>
+                        <a:t>Rxnrom</a:t>
+                      </a:r>
+                      <a:r>
+                        <a:rPr lang="en-US" sz="1200" dirty="0"/>
+                        <a:t> code)</a:t>
+                      </a:r>
+                    </a:p>
+                    <a:p>
+                      <a:pPr marL="171450" marR="0" lvl="0" indent="-171450" algn="l" defTabSz="914400" rtl="0" eaLnBrk="1" fontAlgn="auto" latinLnBrk="0" hangingPunct="1">
+                        <a:lnSpc>
+                          <a:spcPct val="100000"/>
+                        </a:lnSpc>
+                        <a:spcBef>
+                          <a:spcPts val="0"/>
+                        </a:spcBef>
+                        <a:spcAft>
+                          <a:spcPts val="0"/>
+                        </a:spcAft>
+                        <a:buClrTx/>
+                        <a:buSzTx/>
+                        <a:buFont typeface="Arial" panose="020B0604020202020204" pitchFamily="34" charset="0"/>
+                        <a:buChar char="•"/>
+                        <a:tabLst/>
+                        <a:defRPr/>
+                      </a:pPr>
+                      <a:r>
+                        <a:rPr lang="en-US" sz="1200" dirty="0"/>
+                        <a:t>OP Antibiotics (date, type, med therapy class, </a:t>
+                      </a:r>
+                      <a:r>
+                        <a:rPr lang="en-US" sz="1200" dirty="0" err="1"/>
+                        <a:t>Rxnrom</a:t>
+                      </a:r>
+                      <a:r>
+                        <a:rPr lang="en-US" sz="1200" dirty="0"/>
+                        <a:t> code)</a:t>
                       </a:r>
                     </a:p>
                   </a:txBody>
@@ -12511,13 +12326,16 @@
                   </a:ext>
                 </a:extLst>
               </a:tr>
-              <a:tr h="370840">
+              <a:tr h="330283">
                 <a:tc>
                   <a:txBody>
                     <a:bodyPr/>
                     <a:lstStyle/>
                     <a:p>
-                      <a:endParaRPr lang="en-US" sz="1200" dirty="0"/>
+                      <a:r>
+                        <a:rPr lang="en-US" sz="1200" dirty="0"/>
+                        <a:t>Problem List</a:t>
+                      </a:r>
                     </a:p>
                   </a:txBody>
                   <a:tcPr/>
@@ -12527,7 +12345,10 @@
                     <a:bodyPr/>
                     <a:lstStyle/>
                     <a:p>
-                      <a:endParaRPr lang="en-US" sz="1200" dirty="0"/>
+                      <a:r>
+                        <a:rPr lang="en-US" sz="1200" dirty="0"/>
+                        <a:t>ICD9/10: depression, CVD, cancer</a:t>
+                      </a:r>
                     </a:p>
                   </a:txBody>
                   <a:tcPr/>
@@ -12555,6 +12376,73 @@
                 <a:extLst>
                   <a:ext uri="{0D108BD9-81ED-4DB2-BD59-A6C34878D82A}">
                     <a16:rowId xmlns:a16="http://schemas.microsoft.com/office/drawing/2014/main" val="706808565"/>
+                  </a:ext>
+                </a:extLst>
+              </a:tr>
+              <a:tr h="407199">
+                <a:tc>
+                  <a:txBody>
+                    <a:bodyPr/>
+                    <a:lstStyle/>
+                    <a:p>
+                      <a:r>
+                        <a:rPr lang="en-US" sz="1200" dirty="0"/>
+                        <a:t>Delivery Details</a:t>
+                      </a:r>
+                    </a:p>
+                  </a:txBody>
+                  <a:tcPr/>
+                </a:tc>
+                <a:tc>
+                  <a:txBody>
+                    <a:bodyPr/>
+                    <a:lstStyle/>
+                    <a:p>
+                      <a:pPr marL="171450" indent="-171450">
+                        <a:buFont typeface="Arial" panose="020B0604020202020204" pitchFamily="34" charset="0"/>
+                        <a:buChar char="•"/>
+                      </a:pPr>
+                      <a:r>
+                        <a:rPr lang="en-US" sz="1200" dirty="0"/>
+                        <a:t>Pediatric Delivery Type </a:t>
+                      </a:r>
+                    </a:p>
+                    <a:p>
+                      <a:pPr marL="171450" indent="-171450">
+                        <a:buFont typeface="Arial" panose="020B0604020202020204" pitchFamily="34" charset="0"/>
+                        <a:buChar char="•"/>
+                      </a:pPr>
+                      <a:r>
+                        <a:rPr lang="en-US" sz="1200" dirty="0"/>
+                        <a:t>Admit Date</a:t>
+                      </a:r>
+                    </a:p>
+                  </a:txBody>
+                  <a:tcPr/>
+                </a:tc>
+                <a:tc>
+                  <a:txBody>
+                    <a:bodyPr/>
+                    <a:lstStyle/>
+                    <a:p>
+                      <a:endParaRPr lang="en-US" sz="1200" dirty="0"/>
+                    </a:p>
+                  </a:txBody>
+                  <a:tcPr/>
+                </a:tc>
+                <a:tc>
+                  <a:txBody>
+                    <a:bodyPr/>
+                    <a:lstStyle/>
+                    <a:p>
+                      <a:endParaRPr lang="en-US" sz="1200" dirty="0"/>
+                    </a:p>
+                  </a:txBody>
+                  <a:tcPr/>
+                </a:tc>
+                <a:extLst>
+                  <a:ext uri="{0D108BD9-81ED-4DB2-BD59-A6C34878D82A}">
+                    <a16:rowId xmlns:a16="http://schemas.microsoft.com/office/drawing/2014/main" val="1782459231"/>
                   </a:ext>
                 </a:extLst>
               </a:tr>
@@ -12639,11 +12527,17 @@
           <p:cNvGraphicFramePr>
             <a:graphicFrameLocks noGrp="1"/>
           </p:cNvGraphicFramePr>
-          <p:nvPr/>
+          <p:nvPr>
+            <p:extLst>
+              <p:ext uri="{D42A27DB-BD31-4B8C-83A1-F6EECF244321}">
+                <p14:modId xmlns:p14="http://schemas.microsoft.com/office/powerpoint/2010/main" val="3131018874"/>
+              </p:ext>
+            </p:extLst>
+          </p:nvPr>
         </p:nvGraphicFramePr>
         <p:xfrm>
-          <a:off x="874295" y="1014574"/>
-          <a:ext cx="7978274" cy="4038600"/>
+          <a:off x="456670" y="381124"/>
+          <a:ext cx="10984214" cy="6476876"/>
         </p:xfrm>
         <a:graphic>
           <a:graphicData uri="http://schemas.openxmlformats.org/drawingml/2006/table">
@@ -12652,28 +12546,28 @@
                 <a:tableStyleId>{5C22544A-7EE6-4342-B048-85BDC9FD1C3A}</a:tableStyleId>
               </a:tblPr>
               <a:tblGrid>
-                <a:gridCol w="1882274">
+                <a:gridCol w="2591452">
                   <a:extLst>
                     <a:ext uri="{9D8B030D-6E8A-4147-A177-3AD203B41FA5}">
                       <a16:colId xmlns:a16="http://schemas.microsoft.com/office/drawing/2014/main" val="3104375195"/>
                     </a:ext>
                   </a:extLst>
                 </a:gridCol>
-                <a:gridCol w="2184400">
+                <a:gridCol w="3007406">
                   <a:extLst>
                     <a:ext uri="{9D8B030D-6E8A-4147-A177-3AD203B41FA5}">
                       <a16:colId xmlns:a16="http://schemas.microsoft.com/office/drawing/2014/main" val="3449709606"/>
                     </a:ext>
                   </a:extLst>
                 </a:gridCol>
-                <a:gridCol w="1879600">
+                <a:gridCol w="2587768">
                   <a:extLst>
                     <a:ext uri="{9D8B030D-6E8A-4147-A177-3AD203B41FA5}">
                       <a16:colId xmlns:a16="http://schemas.microsoft.com/office/drawing/2014/main" val="1547008946"/>
                     </a:ext>
                   </a:extLst>
                 </a:gridCol>
-                <a:gridCol w="2032000">
+                <a:gridCol w="2797588">
                   <a:extLst>
                     <a:ext uri="{9D8B030D-6E8A-4147-A177-3AD203B41FA5}">
                       <a16:colId xmlns:a16="http://schemas.microsoft.com/office/drawing/2014/main" val="1891596437"/>
@@ -12681,7 +12575,7 @@
                   </a:extLst>
                 </a:gridCol>
               </a:tblGrid>
-              <a:tr h="370840">
+              <a:tr h="284233">
                 <a:tc>
                   <a:txBody>
                     <a:bodyPr/>
@@ -12740,7 +12634,7 @@
                   </a:ext>
                 </a:extLst>
               </a:tr>
-              <a:tr h="370840">
+              <a:tr h="539010">
                 <a:tc>
                   <a:txBody>
                     <a:bodyPr/>
@@ -12817,7 +12711,7 @@
                   </a:ext>
                 </a:extLst>
               </a:tr>
-              <a:tr h="370840">
+              <a:tr h="385007">
                 <a:tc>
                   <a:txBody>
                     <a:bodyPr/>
@@ -12825,7 +12719,7 @@
                     <a:p>
                       <a:r>
                         <a:rPr lang="en-US" sz="1200" dirty="0"/>
-                        <a:t>Vital Signs</a:t>
+                        <a:t>Maternal Vital Signs</a:t>
                       </a:r>
                     </a:p>
                   </a:txBody>
@@ -12889,7 +12783,7 @@
                   </a:ext>
                 </a:extLst>
               </a:tr>
-              <a:tr h="370840">
+              <a:tr h="693013">
                 <a:tc>
                   <a:txBody>
                     <a:bodyPr/>
@@ -12897,13 +12791,7 @@
                     <a:p>
                       <a:r>
                         <a:rPr lang="en-US" sz="1200" dirty="0"/>
-                        <a:t>Outpatient encounters</a:t>
-                      </a:r>
-                    </a:p>
-                    <a:p>
-                      <a:r>
-                        <a:rPr lang="en-US" sz="1200" dirty="0"/>
-                        <a:t>ICD9/10 codes </a:t>
+                        <a:t>Infant Vital Signs</a:t>
                       </a:r>
                     </a:p>
                   </a:txBody>
@@ -12920,7 +12808,7 @@
                       </a:pPr>
                       <a:r>
                         <a:rPr lang="en-US" sz="1200" dirty="0"/>
-                        <a:t>asthma: </a:t>
+                        <a:t>First head circumference</a:t>
                       </a:r>
                     </a:p>
                     <a:p>
@@ -12930,7 +12818,17 @@
                       </a:pPr>
                       <a:r>
                         <a:rPr lang="en-US" sz="1200" dirty="0"/>
-                        <a:t>Obesity</a:t>
+                        <a:t>First height</a:t>
+                      </a:r>
+                    </a:p>
+                    <a:p>
+                      <a:pPr marL="285750" indent="-285750">
+                        <a:buFont typeface="Arial" panose="020B0604020202020204" pitchFamily="34" charset="0"/>
+                        <a:buChar char="•"/>
+                      </a:pPr>
+                      <a:r>
+                        <a:rPr lang="en-US" sz="1200" dirty="0"/>
+                        <a:t>Wellness Visit (Date), Height, Weight, head circumference</a:t>
                       </a:r>
                     </a:p>
                   </a:txBody>
@@ -12962,7 +12860,166 @@
                   </a:ext>
                 </a:extLst>
               </a:tr>
-              <a:tr h="370840">
+              <a:tr h="1617031">
+                <a:tc>
+                  <a:txBody>
+                    <a:bodyPr/>
+                    <a:lstStyle/>
+                    <a:p>
+                      <a:r>
+                        <a:rPr lang="en-US" sz="1200" dirty="0"/>
+                        <a:t>Outpatient encounters</a:t>
+                      </a:r>
+                    </a:p>
+                    <a:p>
+                      <a:r>
+                        <a:rPr lang="en-US" sz="1200" dirty="0"/>
+                        <a:t>ICD9/10 codes </a:t>
+                      </a:r>
+                    </a:p>
+                  </a:txBody>
+                  <a:tcPr/>
+                </a:tc>
+                <a:tc>
+                  <a:txBody>
+                    <a:bodyPr/>
+                    <a:lstStyle/>
+                    <a:p>
+                      <a:pPr marL="285750" indent="-285750">
+                        <a:buFont typeface="Arial" panose="020B0604020202020204" pitchFamily="34" charset="0"/>
+                        <a:buChar char="•"/>
+                      </a:pPr>
+                      <a:r>
+                        <a:rPr lang="en-US" sz="1200" dirty="0"/>
+                        <a:t>asthma</a:t>
+                      </a:r>
+                    </a:p>
+                    <a:p>
+                      <a:pPr marL="285750" indent="-285750">
+                        <a:buFont typeface="Arial" panose="020B0604020202020204" pitchFamily="34" charset="0"/>
+                        <a:buChar char="•"/>
+                      </a:pPr>
+                      <a:r>
+                        <a:rPr lang="en-US" sz="1200" dirty="0"/>
+                        <a:t>Obesity</a:t>
+                      </a:r>
+                    </a:p>
+                    <a:p>
+                      <a:pPr marL="285750" indent="-285750">
+                        <a:buFont typeface="Arial" panose="020B0604020202020204" pitchFamily="34" charset="0"/>
+                        <a:buChar char="•"/>
+                      </a:pPr>
+                      <a:r>
+                        <a:rPr lang="en-US" sz="1200" dirty="0"/>
+                        <a:t>Ear Infection</a:t>
+                      </a:r>
+                    </a:p>
+                    <a:p>
+                      <a:pPr marL="285750" indent="-285750">
+                        <a:buFont typeface="Arial" panose="020B0604020202020204" pitchFamily="34" charset="0"/>
+                        <a:buChar char="•"/>
+                      </a:pPr>
+                      <a:r>
+                        <a:rPr lang="en-US" sz="1200" dirty="0"/>
+                        <a:t>Eczema</a:t>
+                      </a:r>
+                    </a:p>
+                    <a:p>
+                      <a:pPr marL="285750" indent="-285750">
+                        <a:buFont typeface="Arial" panose="020B0604020202020204" pitchFamily="34" charset="0"/>
+                        <a:buChar char="•"/>
+                      </a:pPr>
+                      <a:r>
+                        <a:rPr lang="en-US" sz="1200" dirty="0"/>
+                        <a:t>Food allergy</a:t>
+                      </a:r>
+                    </a:p>
+                    <a:p>
+                      <a:pPr marL="285750" indent="-285750">
+                        <a:buFont typeface="Arial" panose="020B0604020202020204" pitchFamily="34" charset="0"/>
+                        <a:buChar char="•"/>
+                      </a:pPr>
+                      <a:r>
+                        <a:rPr lang="en-US" sz="1200" dirty="0" err="1"/>
+                        <a:t>Hemangonia</a:t>
+                      </a:r>
+                      <a:r>
+                        <a:rPr lang="en-US" sz="1200" dirty="0"/>
+                        <a:t> </a:t>
+                      </a:r>
+                    </a:p>
+                    <a:p>
+                      <a:pPr marL="285750" indent="-285750">
+                        <a:buFont typeface="Arial" panose="020B0604020202020204" pitchFamily="34" charset="0"/>
+                        <a:buChar char="•"/>
+                      </a:pPr>
+                      <a:r>
+                        <a:rPr lang="en-US" sz="1200" dirty="0"/>
+                        <a:t>Nevus</a:t>
+                      </a:r>
+                    </a:p>
+                    <a:p>
+                      <a:pPr marL="285750" indent="-285750">
+                        <a:buFont typeface="Arial" panose="020B0604020202020204" pitchFamily="34" charset="0"/>
+                        <a:buChar char="•"/>
+                      </a:pPr>
+                      <a:r>
+                        <a:rPr lang="en-US" sz="1200" dirty="0" err="1"/>
+                        <a:t>Sebor</a:t>
+                      </a:r>
+                      <a:endParaRPr lang="en-US" sz="1200" dirty="0"/>
+                    </a:p>
+                    <a:p>
+                      <a:pPr marL="285750" indent="-285750">
+                        <a:buFont typeface="Arial" panose="020B0604020202020204" pitchFamily="34" charset="0"/>
+                        <a:buChar char="•"/>
+                      </a:pPr>
+                      <a:r>
+                        <a:rPr lang="en-US" sz="1200" dirty="0" err="1"/>
+                        <a:t>Toxicum</a:t>
+                      </a:r>
+                      <a:endParaRPr lang="en-US" sz="1200" dirty="0"/>
+                    </a:p>
+                    <a:p>
+                      <a:pPr marL="285750" indent="-285750">
+                        <a:buFont typeface="Arial" panose="020B0604020202020204" pitchFamily="34" charset="0"/>
+                        <a:buChar char="•"/>
+                      </a:pPr>
+                      <a:r>
+                        <a:rPr lang="en-US" sz="1200" dirty="0"/>
+                        <a:t>Vaccines</a:t>
+                      </a:r>
+                    </a:p>
+                  </a:txBody>
+                  <a:tcPr/>
+                </a:tc>
+                <a:tc>
+                  <a:txBody>
+                    <a:bodyPr/>
+                    <a:lstStyle/>
+                    <a:p>
+                      <a:endParaRPr lang="en-US" sz="1200" dirty="0"/>
+                    </a:p>
+                  </a:txBody>
+                  <a:tcPr/>
+                </a:tc>
+                <a:tc>
+                  <a:txBody>
+                    <a:bodyPr/>
+                    <a:lstStyle/>
+                    <a:p>
+                      <a:endParaRPr lang="en-US" sz="1200" dirty="0"/>
+                    </a:p>
+                  </a:txBody>
+                  <a:tcPr/>
+                </a:tc>
+                <a:extLst>
+                  <a:ext uri="{0D108BD9-81ED-4DB2-BD59-A6C34878D82A}">
+                    <a16:rowId xmlns:a16="http://schemas.microsoft.com/office/drawing/2014/main" val="3589019905"/>
+                  </a:ext>
+                </a:extLst>
+              </a:tr>
+              <a:tr h="385007">
                 <a:tc>
                   <a:txBody>
                     <a:bodyPr/>
@@ -13009,59 +13066,6 @@
                         <a:t>ICD9/10 codes</a:t>
                       </a:r>
                     </a:p>
-                    <a:p>
-                      <a:endParaRPr lang="en-US" sz="1200" dirty="0"/>
-                    </a:p>
-                  </a:txBody>
-                  <a:tcPr/>
-                </a:tc>
-                <a:tc>
-                  <a:txBody>
-                    <a:bodyPr/>
-                    <a:lstStyle/>
-                    <a:p>
-                      <a:endParaRPr lang="en-US" sz="1200" dirty="0"/>
-                    </a:p>
-                  </a:txBody>
-                  <a:tcPr/>
-                </a:tc>
-                <a:tc>
-                  <a:txBody>
-                    <a:bodyPr/>
-                    <a:lstStyle/>
-                    <a:p>
-                      <a:endParaRPr lang="en-US" sz="1200" dirty="0"/>
-                    </a:p>
-                  </a:txBody>
-                  <a:tcPr/>
-                </a:tc>
-                <a:extLst>
-                  <a:ext uri="{0D108BD9-81ED-4DB2-BD59-A6C34878D82A}">
-                    <a16:rowId xmlns:a16="http://schemas.microsoft.com/office/drawing/2014/main" val="3589019905"/>
-                  </a:ext>
-                </a:extLst>
-              </a:tr>
-              <a:tr h="370840">
-                <a:tc>
-                  <a:txBody>
-                    <a:bodyPr/>
-                    <a:lstStyle/>
-                    <a:p>
-                      <a:r>
-                        <a:rPr lang="en-US" sz="1200" dirty="0"/>
-                        <a:t>Medication</a:t>
-                      </a:r>
-                    </a:p>
-                  </a:txBody>
-                  <a:tcPr/>
-                </a:tc>
-                <a:tc>
-                  <a:txBody>
-                    <a:bodyPr/>
-                    <a:lstStyle/>
-                    <a:p>
-                      <a:endParaRPr lang="en-US" sz="1200" dirty="0"/>
-                    </a:p>
                   </a:txBody>
                   <a:tcPr/>
                 </a:tc>
@@ -13091,7 +13095,7 @@
                   </a:ext>
                 </a:extLst>
               </a:tr>
-              <a:tr h="370840">
+              <a:tr h="739006">
                 <a:tc>
                   <a:txBody>
                     <a:bodyPr/>
@@ -13099,7 +13103,7 @@
                     <a:p>
                       <a:r>
                         <a:rPr lang="en-US" sz="1200" dirty="0"/>
-                        <a:t>Problem List</a:t>
+                        <a:t>Infant Medication</a:t>
                       </a:r>
                     </a:p>
                   </a:txBody>
@@ -13110,9 +13114,39 @@
                     <a:bodyPr/>
                     <a:lstStyle/>
                     <a:p>
+                      <a:pPr marL="171450" indent="-171450">
+                        <a:buFont typeface="Arial" panose="020B0604020202020204" pitchFamily="34" charset="0"/>
+                        <a:buChar char="•"/>
+                      </a:pPr>
                       <a:r>
                         <a:rPr lang="en-US" sz="1200" dirty="0"/>
-                        <a:t>ICD9/10: depression, CVD, cancer</a:t>
+                        <a:t>IP antibiotics (date, type, med therapy class, </a:t>
+                      </a:r>
+                      <a:r>
+                        <a:rPr lang="en-US" sz="1200" dirty="0" err="1"/>
+                        <a:t>Rxnrom</a:t>
+                      </a:r>
+                      <a:r>
+                        <a:rPr lang="en-US" sz="1200" dirty="0"/>
+                        <a:t> code)</a:t>
+                      </a:r>
+                    </a:p>
+                    <a:p>
+                      <a:pPr marL="171450" indent="-171450">
+                        <a:buFont typeface="Arial" panose="020B0604020202020204" pitchFamily="34" charset="0"/>
+                        <a:buChar char="•"/>
+                      </a:pPr>
+                      <a:r>
+                        <a:rPr lang="en-US" sz="1200" dirty="0"/>
+                        <a:t>OP antibiotics (date, type, med therapy class, </a:t>
+                      </a:r>
+                      <a:r>
+                        <a:rPr lang="en-US" sz="1200" dirty="0" err="1"/>
+                        <a:t>Rxnrom</a:t>
+                      </a:r>
+                      <a:r>
+                        <a:rPr lang="en-US" sz="1200" dirty="0"/>
+                        <a:t> code)</a:t>
                       </a:r>
                     </a:p>
                   </a:txBody>
@@ -13144,7 +13178,7 @@
                   </a:ext>
                 </a:extLst>
               </a:tr>
-              <a:tr h="370840">
+              <a:tr h="513450">
                 <a:tc>
                   <a:txBody>
                     <a:bodyPr/>
@@ -13152,7 +13186,7 @@
                     <a:p>
                       <a:r>
                         <a:rPr lang="en-US" sz="1200" dirty="0"/>
-                        <a:t>Free Text</a:t>
+                        <a:t>Maternal Medication</a:t>
                       </a:r>
                     </a:p>
                   </a:txBody>
@@ -13163,9 +13197,23 @@
                     <a:bodyPr/>
                     <a:lstStyle/>
                     <a:p>
+                      <a:pPr marL="171450" indent="-171450">
+                        <a:buFont typeface="Arial" panose="020B0604020202020204" pitchFamily="34" charset="0"/>
+                        <a:buChar char="•"/>
+                      </a:pPr>
                       <a:r>
                         <a:rPr lang="en-US" sz="1200" dirty="0"/>
-                        <a:t>Clinical Notes</a:t>
+                        <a:t>IP antibiotics </a:t>
+                      </a:r>
+                    </a:p>
+                    <a:p>
+                      <a:pPr marL="171450" indent="-171450">
+                        <a:buFont typeface="Arial" panose="020B0604020202020204" pitchFamily="34" charset="0"/>
+                        <a:buChar char="•"/>
+                      </a:pPr>
+                      <a:r>
+                        <a:rPr lang="en-US" sz="1200" dirty="0"/>
+                        <a:t>P antibiotics </a:t>
                       </a:r>
                     </a:p>
                   </a:txBody>
@@ -13197,13 +13245,16 @@
                   </a:ext>
                 </a:extLst>
               </a:tr>
-              <a:tr h="370840">
+              <a:tr h="284233">
                 <a:tc>
                   <a:txBody>
                     <a:bodyPr/>
                     <a:lstStyle/>
                     <a:p>
-                      <a:endParaRPr lang="en-US" sz="1200" dirty="0"/>
+                      <a:r>
+                        <a:rPr lang="en-US" sz="1200" dirty="0"/>
+                        <a:t>Problem List</a:t>
+                      </a:r>
                     </a:p>
                   </a:txBody>
                   <a:tcPr/>
@@ -13213,7 +13264,10 @@
                     <a:bodyPr/>
                     <a:lstStyle/>
                     <a:p>
-                      <a:endParaRPr lang="en-US" sz="1200" dirty="0"/>
+                      <a:r>
+                        <a:rPr lang="en-US" sz="1200" dirty="0"/>
+                        <a:t>ICD9/10: depression, CVD, cancer</a:t>
+                      </a:r>
                     </a:p>
                   </a:txBody>
                   <a:tcPr/>
@@ -13244,6 +13298,59 @@
                   </a:ext>
                 </a:extLst>
               </a:tr>
+              <a:tr h="231004">
+                <a:tc>
+                  <a:txBody>
+                    <a:bodyPr/>
+                    <a:lstStyle/>
+                    <a:p>
+                      <a:r>
+                        <a:rPr lang="en-US" sz="1200" dirty="0"/>
+                        <a:t>Free Text</a:t>
+                      </a:r>
+                    </a:p>
+                  </a:txBody>
+                  <a:tcPr/>
+                </a:tc>
+                <a:tc>
+                  <a:txBody>
+                    <a:bodyPr/>
+                    <a:lstStyle/>
+                    <a:p>
+                      <a:r>
+                        <a:rPr lang="en-US" sz="1200" dirty="0"/>
+                        <a:t>Clinical Notes</a:t>
+                      </a:r>
+                    </a:p>
+                  </a:txBody>
+                  <a:tcPr/>
+                </a:tc>
+                <a:tc>
+                  <a:txBody>
+                    <a:bodyPr/>
+                    <a:lstStyle/>
+                    <a:p>
+                      <a:endParaRPr lang="en-US" sz="1200" dirty="0"/>
+                    </a:p>
+                  </a:txBody>
+                  <a:tcPr/>
+                </a:tc>
+                <a:tc>
+                  <a:txBody>
+                    <a:bodyPr/>
+                    <a:lstStyle/>
+                    <a:p>
+                      <a:endParaRPr lang="en-US" sz="1200" dirty="0"/>
+                    </a:p>
+                  </a:txBody>
+                  <a:tcPr/>
+                </a:tc>
+                <a:extLst>
+                  <a:ext uri="{0D108BD9-81ED-4DB2-BD59-A6C34878D82A}">
+                    <a16:rowId xmlns:a16="http://schemas.microsoft.com/office/drawing/2014/main" val="120721184"/>
+                  </a:ext>
+                </a:extLst>
+              </a:tr>
             </a:tbl>
           </a:graphicData>
         </a:graphic>
@@ -13262,7 +13369,7 @@
         </p:nvSpPr>
         <p:spPr>
           <a:xfrm>
-            <a:off x="2946400" y="341745"/>
+            <a:off x="2848429" y="11792"/>
             <a:ext cx="2724727" cy="369332"/>
           </a:xfrm>
           <a:prstGeom prst="rect">

</xml_diff>